<commit_message>
updated presentation, fixed footer, add more recipes
</commit_message>
<xml_diff>
--- a/Rezptapp.pptx
+++ b/Rezptapp.pptx
@@ -5,11 +5,17 @@
     <p:sldMasterId id="2147483671" r:id="rId1"/>
   </p:sldMasterIdLst>
   <p:notesMasterIdLst>
-    <p:notesMasterId r:id="rId4"/>
+    <p:notesMasterId r:id="rId10"/>
   </p:notesMasterIdLst>
   <p:sldIdLst>
     <p:sldId id="256" r:id="rId2"/>
     <p:sldId id="257" r:id="rId3"/>
+    <p:sldId id="258" r:id="rId4"/>
+    <p:sldId id="259" r:id="rId5"/>
+    <p:sldId id="260" r:id="rId6"/>
+    <p:sldId id="261" r:id="rId7"/>
+    <p:sldId id="262" r:id="rId8"/>
+    <p:sldId id="263" r:id="rId9"/>
   </p:sldIdLst>
   <p:sldSz cx="12192000" cy="6858000"/>
   <p:notesSz cx="6858000" cy="9144000"/>
@@ -624,6 +630,90 @@
     <p:extLst>
       <p:ext uri="{BB962C8B-B14F-4D97-AF65-F5344CB8AC3E}">
         <p14:creationId xmlns:p14="http://schemas.microsoft.com/office/powerpoint/2010/main" val="3610826465"/>
+      </p:ext>
+    </p:extLst>
+  </p:cSld>
+  <p:clrMapOvr>
+    <a:masterClrMapping/>
+  </p:clrMapOvr>
+</p:notes>
+</file>
+
+<file path=ppt/notesSlides/notesSlide3.xml><?xml version="1.0" encoding="utf-8"?>
+<p:notes xmlns:a="http://schemas.openxmlformats.org/drawingml/2006/main" xmlns:r="http://schemas.openxmlformats.org/officeDocument/2006/relationships" xmlns:p="http://schemas.openxmlformats.org/presentationml/2006/main">
+  <p:cSld>
+    <p:spTree>
+      <p:nvGrpSpPr>
+        <p:cNvPr id="1" name=""/>
+        <p:cNvGrpSpPr/>
+        <p:nvPr/>
+      </p:nvGrpSpPr>
+      <p:grpSpPr>
+        <a:xfrm>
+          <a:off x="0" y="0"/>
+          <a:ext cx="0" cy="0"/>
+          <a:chOff x="0" y="0"/>
+          <a:chExt cx="0" cy="0"/>
+        </a:xfrm>
+      </p:grpSpPr>
+      <p:sp>
+        <p:nvSpPr>
+          <p:cNvPr id="2" name="Folienbildplatzhalter 1"/>
+          <p:cNvSpPr>
+            <a:spLocks noGrp="1" noRot="1" noChangeAspect="1"/>
+          </p:cNvSpPr>
+          <p:nvPr>
+            <p:ph type="sldImg"/>
+          </p:nvPr>
+        </p:nvSpPr>
+        <p:spPr/>
+      </p:sp>
+      <p:sp>
+        <p:nvSpPr>
+          <p:cNvPr id="3" name="Notizenplatzhalter 2"/>
+          <p:cNvSpPr>
+            <a:spLocks noGrp="1"/>
+          </p:cNvSpPr>
+          <p:nvPr>
+            <p:ph type="body" idx="1"/>
+          </p:nvPr>
+        </p:nvSpPr>
+        <p:spPr/>
+        <p:txBody>
+          <a:bodyPr/>
+          <a:lstStyle/>
+          <a:p>
+            <a:endParaRPr lang="de-DE"/>
+          </a:p>
+        </p:txBody>
+      </p:sp>
+      <p:sp>
+        <p:nvSpPr>
+          <p:cNvPr id="4" name="Foliennummernplatzhalter 3"/>
+          <p:cNvSpPr>
+            <a:spLocks noGrp="1"/>
+          </p:cNvSpPr>
+          <p:nvPr>
+            <p:ph type="sldNum" sz="quarter" idx="10"/>
+          </p:nvPr>
+        </p:nvSpPr>
+        <p:spPr/>
+        <p:txBody>
+          <a:bodyPr/>
+          <a:lstStyle/>
+          <a:p>
+            <a:fld id="{0F565E2B-0033-4D47-8B58-5FB2078FE6FF}" type="slidenum">
+              <a:rPr lang="de-DE"/>
+              <a:t>8</a:t>
+            </a:fld>
+            <a:endParaRPr lang="de-DE"/>
+          </a:p>
+        </p:txBody>
+      </p:sp>
+    </p:spTree>
+    <p:extLst>
+      <p:ext uri="{BB962C8B-B14F-4D97-AF65-F5344CB8AC3E}">
+        <p14:creationId xmlns:p14="http://schemas.microsoft.com/office/powerpoint/2010/main" val="3045749672"/>
       </p:ext>
     </p:extLst>
   </p:cSld>
@@ -6574,23 +6664,7 @@
           <a:p>
             <a:r>
               <a:rPr lang="de-DE" dirty="0" smtClean="0"/>
-              <a:t>App-programmierung</a:t>
-            </a:r>
-            <a:r>
-              <a:rPr lang="de-DE" dirty="0" smtClean="0"/>
-              <a:t> </a:t>
-            </a:r>
-            <a:r>
-              <a:rPr lang="de-DE" dirty="0" smtClean="0"/>
-              <a:t>von </a:t>
-            </a:r>
-            <a:r>
-              <a:rPr lang="de-DE" dirty="0" smtClean="0"/>
-              <a:t>Anna S. Rodewald </a:t>
-            </a:r>
-            <a:r>
-              <a:rPr lang="de-DE" dirty="0" smtClean="0"/>
-              <a:t>und </a:t>
+              <a:t>App-programmierung von Anna S. Rodewald und </a:t>
             </a:r>
             <a:r>
               <a:rPr lang="de-DE" dirty="0" err="1" smtClean="0"/>
@@ -6717,6 +6791,1443 @@
   <p:clrMapOvr>
     <a:masterClrMapping/>
   </p:clrMapOvr>
+</p:sld>
+</file>
+
+<file path=ppt/slides/slide3.xml><?xml version="1.0" encoding="utf-8"?>
+<p:sld xmlns:a="http://schemas.openxmlformats.org/drawingml/2006/main" xmlns:r="http://schemas.openxmlformats.org/officeDocument/2006/relationships" xmlns:p="http://schemas.openxmlformats.org/presentationml/2006/main">
+  <p:cSld>
+    <p:spTree>
+      <p:nvGrpSpPr>
+        <p:cNvPr id="1" name=""/>
+        <p:cNvGrpSpPr/>
+        <p:nvPr/>
+      </p:nvGrpSpPr>
+      <p:grpSpPr>
+        <a:xfrm>
+          <a:off x="0" y="0"/>
+          <a:ext cx="0" cy="0"/>
+          <a:chOff x="0" y="0"/>
+          <a:chExt cx="0" cy="0"/>
+        </a:xfrm>
+      </p:grpSpPr>
+      <p:sp>
+        <p:nvSpPr>
+          <p:cNvPr id="2" name="Titel 1"/>
+          <p:cNvSpPr>
+            <a:spLocks noGrp="1"/>
+          </p:cNvSpPr>
+          <p:nvPr>
+            <p:ph type="title"/>
+          </p:nvPr>
+        </p:nvSpPr>
+        <p:spPr/>
+        <p:txBody>
+          <a:bodyPr/>
+          <a:lstStyle/>
+          <a:p>
+            <a:r>
+              <a:rPr lang="de-DE" dirty="0" err="1" smtClean="0"/>
+              <a:t>Use</a:t>
+            </a:r>
+            <a:r>
+              <a:rPr lang="de-DE" dirty="0" smtClean="0"/>
+              <a:t> Case</a:t>
+            </a:r>
+            <a:endParaRPr lang="de-DE" dirty="0"/>
+          </a:p>
+        </p:txBody>
+      </p:sp>
+      <p:sp>
+        <p:nvSpPr>
+          <p:cNvPr id="3" name="Inhaltsplatzhalter 2"/>
+          <p:cNvSpPr>
+            <a:spLocks noGrp="1"/>
+          </p:cNvSpPr>
+          <p:nvPr>
+            <p:ph idx="1"/>
+          </p:nvPr>
+        </p:nvSpPr>
+        <p:spPr/>
+        <p:txBody>
+          <a:bodyPr/>
+          <a:lstStyle/>
+          <a:p>
+            <a:r>
+              <a:rPr lang="de-DE" dirty="0" smtClean="0"/>
+              <a:t>Ein Diagramm vielleicht? </a:t>
+            </a:r>
+            <a:endParaRPr lang="de-DE" dirty="0"/>
+          </a:p>
+        </p:txBody>
+      </p:sp>
+    </p:spTree>
+    <p:extLst>
+      <p:ext uri="{BB962C8B-B14F-4D97-AF65-F5344CB8AC3E}">
+        <p14:creationId xmlns:p14="http://schemas.microsoft.com/office/powerpoint/2010/main" val="686378267"/>
+      </p:ext>
+    </p:extLst>
+  </p:cSld>
+  <p:clrMapOvr>
+    <a:masterClrMapping/>
+  </p:clrMapOvr>
+</p:sld>
+</file>
+
+<file path=ppt/slides/slide4.xml><?xml version="1.0" encoding="utf-8"?>
+<p:sld xmlns:a="http://schemas.openxmlformats.org/drawingml/2006/main" xmlns:r="http://schemas.openxmlformats.org/officeDocument/2006/relationships" xmlns:p="http://schemas.openxmlformats.org/presentationml/2006/main">
+  <p:cSld>
+    <p:spTree>
+      <p:nvGrpSpPr>
+        <p:cNvPr id="1" name=""/>
+        <p:cNvGrpSpPr/>
+        <p:nvPr/>
+      </p:nvGrpSpPr>
+      <p:grpSpPr>
+        <a:xfrm>
+          <a:off x="0" y="0"/>
+          <a:ext cx="0" cy="0"/>
+          <a:chOff x="0" y="0"/>
+          <a:chExt cx="0" cy="0"/>
+        </a:xfrm>
+      </p:grpSpPr>
+      <p:sp>
+        <p:nvSpPr>
+          <p:cNvPr id="2" name="Titel 1"/>
+          <p:cNvSpPr>
+            <a:spLocks noGrp="1"/>
+          </p:cNvSpPr>
+          <p:nvPr>
+            <p:ph type="title"/>
+          </p:nvPr>
+        </p:nvSpPr>
+        <p:spPr/>
+        <p:txBody>
+          <a:bodyPr/>
+          <a:lstStyle/>
+          <a:p>
+            <a:r>
+              <a:rPr lang="de-DE" dirty="0" smtClean="0"/>
+              <a:t>Home</a:t>
+            </a:r>
+            <a:endParaRPr lang="de-DE" dirty="0"/>
+          </a:p>
+        </p:txBody>
+      </p:sp>
+      <p:pic>
+        <p:nvPicPr>
+          <p:cNvPr id="4" name="Inhaltsplatzhalter 3" descr="Bildschirmfoto 2015-06-23 um 22.13.42.png"/>
+          <p:cNvPicPr>
+            <a:picLocks noGrp="1" noChangeAspect="1"/>
+          </p:cNvPicPr>
+          <p:nvPr>
+            <p:ph idx="1"/>
+          </p:nvPr>
+        </p:nvPicPr>
+        <p:blipFill rotWithShape="1">
+          <a:blip r:embed="rId2">
+            <a:extLst>
+              <a:ext uri="{28A0092B-C50C-407E-A947-70E740481C1C}">
+                <a14:useLocalDpi xmlns:a14="http://schemas.microsoft.com/office/drawing/2010/main" val="0"/>
+              </a:ext>
+            </a:extLst>
+          </a:blip>
+          <a:srcRect l="275" t="-588" r="-276980" b="588"/>
+          <a:stretch/>
+        </p:blipFill>
+        <p:spPr/>
+      </p:pic>
+      <p:sp>
+        <p:nvSpPr>
+          <p:cNvPr id="5" name="Inhaltsplatzhalter 2"/>
+          <p:cNvSpPr txBox="1">
+            <a:spLocks/>
+          </p:cNvSpPr>
+          <p:nvPr/>
+        </p:nvSpPr>
+        <p:spPr>
+          <a:xfrm>
+            <a:off x="3773201" y="2095929"/>
+            <a:ext cx="6429052" cy="4117882"/>
+          </a:xfrm>
+          <a:prstGeom prst="rect">
+            <a:avLst/>
+          </a:prstGeom>
+        </p:spPr>
+        <p:txBody>
+          <a:bodyPr vert="horz" lIns="91440" tIns="45720" rIns="91440" bIns="45720" rtlCol="0">
+            <a:normAutofit/>
+          </a:bodyPr>
+          <a:lstStyle>
+            <a:lvl1pPr marL="342900" indent="-342900" algn="l" defTabSz="457200" rtl="0" eaLnBrk="1" latinLnBrk="0" hangingPunct="1">
+              <a:spcBef>
+                <a:spcPts val="1000"/>
+              </a:spcBef>
+              <a:spcAft>
+                <a:spcPts val="0"/>
+              </a:spcAft>
+              <a:buClr>
+                <a:schemeClr val="accent1"/>
+              </a:buClr>
+              <a:buSzPct val="80000"/>
+              <a:buFont typeface="Wingdings 3" charset="2"/>
+              <a:buChar char=""/>
+              <a:defRPr sz="2000" b="0" i="0" kern="1200">
+                <a:solidFill>
+                  <a:schemeClr val="tx1"/>
+                </a:solidFill>
+                <a:latin typeface="+mj-lt"/>
+                <a:ea typeface="+mj-ea"/>
+                <a:cs typeface="+mj-cs"/>
+              </a:defRPr>
+            </a:lvl1pPr>
+            <a:lvl2pPr marL="742950" indent="-285750" algn="l" defTabSz="457200" rtl="0" eaLnBrk="1" latinLnBrk="0" hangingPunct="1">
+              <a:spcBef>
+                <a:spcPts val="1000"/>
+              </a:spcBef>
+              <a:spcAft>
+                <a:spcPts val="0"/>
+              </a:spcAft>
+              <a:buClr>
+                <a:schemeClr val="accent1"/>
+              </a:buClr>
+              <a:buSzPct val="80000"/>
+              <a:buFont typeface="Wingdings 3" charset="2"/>
+              <a:buChar char=""/>
+              <a:defRPr sz="1800" b="0" i="0" kern="1200">
+                <a:solidFill>
+                  <a:schemeClr val="tx1"/>
+                </a:solidFill>
+                <a:latin typeface="+mj-lt"/>
+                <a:ea typeface="+mj-ea"/>
+                <a:cs typeface="+mj-cs"/>
+              </a:defRPr>
+            </a:lvl2pPr>
+            <a:lvl3pPr marL="1143000" indent="-228600" algn="l" defTabSz="457200" rtl="0" eaLnBrk="1" latinLnBrk="0" hangingPunct="1">
+              <a:spcBef>
+                <a:spcPts val="1000"/>
+              </a:spcBef>
+              <a:spcAft>
+                <a:spcPts val="0"/>
+              </a:spcAft>
+              <a:buClr>
+                <a:schemeClr val="accent1"/>
+              </a:buClr>
+              <a:buSzPct val="80000"/>
+              <a:buFont typeface="Wingdings 3" charset="2"/>
+              <a:buChar char=""/>
+              <a:defRPr sz="1600" b="0" i="0" kern="1200">
+                <a:solidFill>
+                  <a:schemeClr val="tx1"/>
+                </a:solidFill>
+                <a:latin typeface="+mj-lt"/>
+                <a:ea typeface="+mj-ea"/>
+                <a:cs typeface="+mj-cs"/>
+              </a:defRPr>
+            </a:lvl3pPr>
+            <a:lvl4pPr marL="1600200" indent="-228600" algn="l" defTabSz="457200" rtl="0" eaLnBrk="1" latinLnBrk="0" hangingPunct="1">
+              <a:spcBef>
+                <a:spcPts val="1000"/>
+              </a:spcBef>
+              <a:spcAft>
+                <a:spcPts val="0"/>
+              </a:spcAft>
+              <a:buClr>
+                <a:schemeClr val="accent1"/>
+              </a:buClr>
+              <a:buSzPct val="80000"/>
+              <a:buFont typeface="Wingdings 3" charset="2"/>
+              <a:buChar char=""/>
+              <a:defRPr sz="1400" b="0" i="0" kern="1200">
+                <a:solidFill>
+                  <a:schemeClr val="tx1"/>
+                </a:solidFill>
+                <a:latin typeface="+mj-lt"/>
+                <a:ea typeface="+mj-ea"/>
+                <a:cs typeface="+mj-cs"/>
+              </a:defRPr>
+            </a:lvl4pPr>
+            <a:lvl5pPr marL="2057400" indent="-228600" algn="l" defTabSz="457200" rtl="0" eaLnBrk="1" latinLnBrk="0" hangingPunct="1">
+              <a:spcBef>
+                <a:spcPts val="1000"/>
+              </a:spcBef>
+              <a:spcAft>
+                <a:spcPts val="0"/>
+              </a:spcAft>
+              <a:buClr>
+                <a:schemeClr val="accent1"/>
+              </a:buClr>
+              <a:buSzPct val="80000"/>
+              <a:buFont typeface="Wingdings 3" charset="2"/>
+              <a:buChar char=""/>
+              <a:defRPr sz="1400" b="0" i="0" kern="1200">
+                <a:solidFill>
+                  <a:schemeClr val="tx1"/>
+                </a:solidFill>
+                <a:latin typeface="+mj-lt"/>
+                <a:ea typeface="+mj-ea"/>
+                <a:cs typeface="+mj-cs"/>
+              </a:defRPr>
+            </a:lvl5pPr>
+            <a:lvl6pPr marL="2514600" indent="-228600" algn="l" defTabSz="457200" rtl="0" eaLnBrk="1" latinLnBrk="0" hangingPunct="1">
+              <a:spcBef>
+                <a:spcPts val="1000"/>
+              </a:spcBef>
+              <a:spcAft>
+                <a:spcPts val="0"/>
+              </a:spcAft>
+              <a:buClr>
+                <a:schemeClr val="accent1"/>
+              </a:buClr>
+              <a:buSzPct val="80000"/>
+              <a:buFont typeface="Wingdings 3" charset="2"/>
+              <a:buChar char=""/>
+              <a:defRPr sz="1400" b="0" i="0" kern="1200">
+                <a:solidFill>
+                  <a:schemeClr val="tx1"/>
+                </a:solidFill>
+                <a:latin typeface="+mj-lt"/>
+                <a:ea typeface="+mj-ea"/>
+                <a:cs typeface="+mj-cs"/>
+              </a:defRPr>
+            </a:lvl6pPr>
+            <a:lvl7pPr marL="2971800" indent="-228600" algn="l" defTabSz="457200" rtl="0" eaLnBrk="1" latinLnBrk="0" hangingPunct="1">
+              <a:spcBef>
+                <a:spcPts val="1000"/>
+              </a:spcBef>
+              <a:spcAft>
+                <a:spcPts val="0"/>
+              </a:spcAft>
+              <a:buClr>
+                <a:schemeClr val="accent1"/>
+              </a:buClr>
+              <a:buSzPct val="80000"/>
+              <a:buFont typeface="Wingdings 3" charset="2"/>
+              <a:buChar char=""/>
+              <a:defRPr sz="1400" b="0" i="0" kern="1200">
+                <a:solidFill>
+                  <a:schemeClr val="tx1"/>
+                </a:solidFill>
+                <a:latin typeface="+mj-lt"/>
+                <a:ea typeface="+mj-ea"/>
+                <a:cs typeface="+mj-cs"/>
+              </a:defRPr>
+            </a:lvl7pPr>
+            <a:lvl8pPr marL="3429000" indent="-228600" algn="l" defTabSz="457200" rtl="0" eaLnBrk="1" latinLnBrk="0" hangingPunct="1">
+              <a:spcBef>
+                <a:spcPts val="1000"/>
+              </a:spcBef>
+              <a:spcAft>
+                <a:spcPts val="0"/>
+              </a:spcAft>
+              <a:buClr>
+                <a:schemeClr val="accent1"/>
+              </a:buClr>
+              <a:buSzPct val="80000"/>
+              <a:buFont typeface="Wingdings 3" charset="2"/>
+              <a:buChar char=""/>
+              <a:defRPr sz="1400" b="0" i="0" kern="1200">
+                <a:solidFill>
+                  <a:schemeClr val="tx1"/>
+                </a:solidFill>
+                <a:latin typeface="+mj-lt"/>
+                <a:ea typeface="+mj-ea"/>
+                <a:cs typeface="+mj-cs"/>
+              </a:defRPr>
+            </a:lvl8pPr>
+            <a:lvl9pPr marL="3886200" indent="-228600" algn="l" defTabSz="457200" rtl="0" eaLnBrk="1" latinLnBrk="0" hangingPunct="1">
+              <a:spcBef>
+                <a:spcPts val="1000"/>
+              </a:spcBef>
+              <a:spcAft>
+                <a:spcPts val="0"/>
+              </a:spcAft>
+              <a:buClr>
+                <a:schemeClr val="accent1"/>
+              </a:buClr>
+              <a:buSzPct val="80000"/>
+              <a:buFont typeface="Wingdings 3" charset="2"/>
+              <a:buChar char=""/>
+              <a:defRPr sz="1400" b="0" i="0" kern="1200">
+                <a:solidFill>
+                  <a:schemeClr val="tx1"/>
+                </a:solidFill>
+                <a:latin typeface="+mj-lt"/>
+                <a:ea typeface="+mj-ea"/>
+                <a:cs typeface="+mj-cs"/>
+              </a:defRPr>
+            </a:lvl9pPr>
+          </a:lstStyle>
+          <a:p>
+            <a:r>
+              <a:rPr lang="de-DE" dirty="0" err="1" smtClean="0"/>
+              <a:t>Adfadf</a:t>
+            </a:r>
+            <a:endParaRPr lang="de-DE" dirty="0" smtClean="0"/>
+          </a:p>
+          <a:p>
+            <a:r>
+              <a:rPr lang="de-DE" dirty="0" err="1" smtClean="0"/>
+              <a:t>adfadf</a:t>
+            </a:r>
+            <a:endParaRPr lang="de-DE" dirty="0"/>
+          </a:p>
+        </p:txBody>
+      </p:sp>
+    </p:spTree>
+    <p:extLst>
+      <p:ext uri="{BB962C8B-B14F-4D97-AF65-F5344CB8AC3E}">
+        <p14:creationId xmlns:p14="http://schemas.microsoft.com/office/powerpoint/2010/main" val="2428661020"/>
+      </p:ext>
+    </p:extLst>
+  </p:cSld>
+  <p:clrMapOvr>
+    <a:masterClrMapping/>
+  </p:clrMapOvr>
+</p:sld>
+</file>
+
+<file path=ppt/slides/slide5.xml><?xml version="1.0" encoding="utf-8"?>
+<p:sld xmlns:a="http://schemas.openxmlformats.org/drawingml/2006/main" xmlns:r="http://schemas.openxmlformats.org/officeDocument/2006/relationships" xmlns:p="http://schemas.openxmlformats.org/presentationml/2006/main">
+  <p:cSld>
+    <p:spTree>
+      <p:nvGrpSpPr>
+        <p:cNvPr id="1" name=""/>
+        <p:cNvGrpSpPr/>
+        <p:nvPr/>
+      </p:nvGrpSpPr>
+      <p:grpSpPr>
+        <a:xfrm>
+          <a:off x="0" y="0"/>
+          <a:ext cx="0" cy="0"/>
+          <a:chOff x="0" y="0"/>
+          <a:chExt cx="0" cy="0"/>
+        </a:xfrm>
+      </p:grpSpPr>
+      <p:sp>
+        <p:nvSpPr>
+          <p:cNvPr id="2" name="Titel 1"/>
+          <p:cNvSpPr>
+            <a:spLocks noGrp="1"/>
+          </p:cNvSpPr>
+          <p:nvPr>
+            <p:ph type="title"/>
+          </p:nvPr>
+        </p:nvSpPr>
+        <p:spPr/>
+        <p:txBody>
+          <a:bodyPr/>
+          <a:lstStyle/>
+          <a:p>
+            <a:r>
+              <a:rPr lang="de-DE" dirty="0" smtClean="0"/>
+              <a:t>Merkzettel</a:t>
+            </a:r>
+            <a:endParaRPr lang="de-DE" dirty="0"/>
+          </a:p>
+        </p:txBody>
+      </p:sp>
+      <p:pic>
+        <p:nvPicPr>
+          <p:cNvPr id="6" name="Inhaltsplatzhalter 5" descr="Bildschirmfoto 2015-06-23 um 22.12.00.png"/>
+          <p:cNvPicPr>
+            <a:picLocks noGrp="1" noChangeAspect="1"/>
+          </p:cNvPicPr>
+          <p:nvPr>
+            <p:ph idx="1"/>
+          </p:nvPr>
+        </p:nvPicPr>
+        <p:blipFill rotWithShape="1">
+          <a:blip r:embed="rId2">
+            <a:extLst>
+              <a:ext uri="{28A0092B-C50C-407E-A947-70E740481C1C}">
+                <a14:useLocalDpi xmlns:a14="http://schemas.microsoft.com/office/drawing/2010/main" val="0"/>
+              </a:ext>
+            </a:extLst>
+          </a:blip>
+          <a:srcRect l="57" t="-882" r="-282408" b="882"/>
+          <a:stretch/>
+        </p:blipFill>
+        <p:spPr/>
+      </p:pic>
+      <p:sp>
+        <p:nvSpPr>
+          <p:cNvPr id="9" name="Inhaltsplatzhalter 2"/>
+          <p:cNvSpPr txBox="1">
+            <a:spLocks/>
+          </p:cNvSpPr>
+          <p:nvPr/>
+        </p:nvSpPr>
+        <p:spPr>
+          <a:xfrm>
+            <a:off x="3773201" y="2095929"/>
+            <a:ext cx="6429052" cy="4117882"/>
+          </a:xfrm>
+          <a:prstGeom prst="rect">
+            <a:avLst/>
+          </a:prstGeom>
+        </p:spPr>
+        <p:txBody>
+          <a:bodyPr vert="horz" lIns="91440" tIns="45720" rIns="91440" bIns="45720" rtlCol="0">
+            <a:normAutofit/>
+          </a:bodyPr>
+          <a:lstStyle>
+            <a:lvl1pPr marL="342900" indent="-342900" algn="l" defTabSz="457200" rtl="0" eaLnBrk="1" latinLnBrk="0" hangingPunct="1">
+              <a:spcBef>
+                <a:spcPts val="1000"/>
+              </a:spcBef>
+              <a:spcAft>
+                <a:spcPts val="0"/>
+              </a:spcAft>
+              <a:buClr>
+                <a:schemeClr val="accent1"/>
+              </a:buClr>
+              <a:buSzPct val="80000"/>
+              <a:buFont typeface="Wingdings 3" charset="2"/>
+              <a:buChar char=""/>
+              <a:defRPr sz="2000" b="0" i="0" kern="1200">
+                <a:solidFill>
+                  <a:schemeClr val="tx1"/>
+                </a:solidFill>
+                <a:latin typeface="+mj-lt"/>
+                <a:ea typeface="+mj-ea"/>
+                <a:cs typeface="+mj-cs"/>
+              </a:defRPr>
+            </a:lvl1pPr>
+            <a:lvl2pPr marL="742950" indent="-285750" algn="l" defTabSz="457200" rtl="0" eaLnBrk="1" latinLnBrk="0" hangingPunct="1">
+              <a:spcBef>
+                <a:spcPts val="1000"/>
+              </a:spcBef>
+              <a:spcAft>
+                <a:spcPts val="0"/>
+              </a:spcAft>
+              <a:buClr>
+                <a:schemeClr val="accent1"/>
+              </a:buClr>
+              <a:buSzPct val="80000"/>
+              <a:buFont typeface="Wingdings 3" charset="2"/>
+              <a:buChar char=""/>
+              <a:defRPr sz="1800" b="0" i="0" kern="1200">
+                <a:solidFill>
+                  <a:schemeClr val="tx1"/>
+                </a:solidFill>
+                <a:latin typeface="+mj-lt"/>
+                <a:ea typeface="+mj-ea"/>
+                <a:cs typeface="+mj-cs"/>
+              </a:defRPr>
+            </a:lvl2pPr>
+            <a:lvl3pPr marL="1143000" indent="-228600" algn="l" defTabSz="457200" rtl="0" eaLnBrk="1" latinLnBrk="0" hangingPunct="1">
+              <a:spcBef>
+                <a:spcPts val="1000"/>
+              </a:spcBef>
+              <a:spcAft>
+                <a:spcPts val="0"/>
+              </a:spcAft>
+              <a:buClr>
+                <a:schemeClr val="accent1"/>
+              </a:buClr>
+              <a:buSzPct val="80000"/>
+              <a:buFont typeface="Wingdings 3" charset="2"/>
+              <a:buChar char=""/>
+              <a:defRPr sz="1600" b="0" i="0" kern="1200">
+                <a:solidFill>
+                  <a:schemeClr val="tx1"/>
+                </a:solidFill>
+                <a:latin typeface="+mj-lt"/>
+                <a:ea typeface="+mj-ea"/>
+                <a:cs typeface="+mj-cs"/>
+              </a:defRPr>
+            </a:lvl3pPr>
+            <a:lvl4pPr marL="1600200" indent="-228600" algn="l" defTabSz="457200" rtl="0" eaLnBrk="1" latinLnBrk="0" hangingPunct="1">
+              <a:spcBef>
+                <a:spcPts val="1000"/>
+              </a:spcBef>
+              <a:spcAft>
+                <a:spcPts val="0"/>
+              </a:spcAft>
+              <a:buClr>
+                <a:schemeClr val="accent1"/>
+              </a:buClr>
+              <a:buSzPct val="80000"/>
+              <a:buFont typeface="Wingdings 3" charset="2"/>
+              <a:buChar char=""/>
+              <a:defRPr sz="1400" b="0" i="0" kern="1200">
+                <a:solidFill>
+                  <a:schemeClr val="tx1"/>
+                </a:solidFill>
+                <a:latin typeface="+mj-lt"/>
+                <a:ea typeface="+mj-ea"/>
+                <a:cs typeface="+mj-cs"/>
+              </a:defRPr>
+            </a:lvl4pPr>
+            <a:lvl5pPr marL="2057400" indent="-228600" algn="l" defTabSz="457200" rtl="0" eaLnBrk="1" latinLnBrk="0" hangingPunct="1">
+              <a:spcBef>
+                <a:spcPts val="1000"/>
+              </a:spcBef>
+              <a:spcAft>
+                <a:spcPts val="0"/>
+              </a:spcAft>
+              <a:buClr>
+                <a:schemeClr val="accent1"/>
+              </a:buClr>
+              <a:buSzPct val="80000"/>
+              <a:buFont typeface="Wingdings 3" charset="2"/>
+              <a:buChar char=""/>
+              <a:defRPr sz="1400" b="0" i="0" kern="1200">
+                <a:solidFill>
+                  <a:schemeClr val="tx1"/>
+                </a:solidFill>
+                <a:latin typeface="+mj-lt"/>
+                <a:ea typeface="+mj-ea"/>
+                <a:cs typeface="+mj-cs"/>
+              </a:defRPr>
+            </a:lvl5pPr>
+            <a:lvl6pPr marL="2514600" indent="-228600" algn="l" defTabSz="457200" rtl="0" eaLnBrk="1" latinLnBrk="0" hangingPunct="1">
+              <a:spcBef>
+                <a:spcPts val="1000"/>
+              </a:spcBef>
+              <a:spcAft>
+                <a:spcPts val="0"/>
+              </a:spcAft>
+              <a:buClr>
+                <a:schemeClr val="accent1"/>
+              </a:buClr>
+              <a:buSzPct val="80000"/>
+              <a:buFont typeface="Wingdings 3" charset="2"/>
+              <a:buChar char=""/>
+              <a:defRPr sz="1400" b="0" i="0" kern="1200">
+                <a:solidFill>
+                  <a:schemeClr val="tx1"/>
+                </a:solidFill>
+                <a:latin typeface="+mj-lt"/>
+                <a:ea typeface="+mj-ea"/>
+                <a:cs typeface="+mj-cs"/>
+              </a:defRPr>
+            </a:lvl6pPr>
+            <a:lvl7pPr marL="2971800" indent="-228600" algn="l" defTabSz="457200" rtl="0" eaLnBrk="1" latinLnBrk="0" hangingPunct="1">
+              <a:spcBef>
+                <a:spcPts val="1000"/>
+              </a:spcBef>
+              <a:spcAft>
+                <a:spcPts val="0"/>
+              </a:spcAft>
+              <a:buClr>
+                <a:schemeClr val="accent1"/>
+              </a:buClr>
+              <a:buSzPct val="80000"/>
+              <a:buFont typeface="Wingdings 3" charset="2"/>
+              <a:buChar char=""/>
+              <a:defRPr sz="1400" b="0" i="0" kern="1200">
+                <a:solidFill>
+                  <a:schemeClr val="tx1"/>
+                </a:solidFill>
+                <a:latin typeface="+mj-lt"/>
+                <a:ea typeface="+mj-ea"/>
+                <a:cs typeface="+mj-cs"/>
+              </a:defRPr>
+            </a:lvl7pPr>
+            <a:lvl8pPr marL="3429000" indent="-228600" algn="l" defTabSz="457200" rtl="0" eaLnBrk="1" latinLnBrk="0" hangingPunct="1">
+              <a:spcBef>
+                <a:spcPts val="1000"/>
+              </a:spcBef>
+              <a:spcAft>
+                <a:spcPts val="0"/>
+              </a:spcAft>
+              <a:buClr>
+                <a:schemeClr val="accent1"/>
+              </a:buClr>
+              <a:buSzPct val="80000"/>
+              <a:buFont typeface="Wingdings 3" charset="2"/>
+              <a:buChar char=""/>
+              <a:defRPr sz="1400" b="0" i="0" kern="1200">
+                <a:solidFill>
+                  <a:schemeClr val="tx1"/>
+                </a:solidFill>
+                <a:latin typeface="+mj-lt"/>
+                <a:ea typeface="+mj-ea"/>
+                <a:cs typeface="+mj-cs"/>
+              </a:defRPr>
+            </a:lvl8pPr>
+            <a:lvl9pPr marL="3886200" indent="-228600" algn="l" defTabSz="457200" rtl="0" eaLnBrk="1" latinLnBrk="0" hangingPunct="1">
+              <a:spcBef>
+                <a:spcPts val="1000"/>
+              </a:spcBef>
+              <a:spcAft>
+                <a:spcPts val="0"/>
+              </a:spcAft>
+              <a:buClr>
+                <a:schemeClr val="accent1"/>
+              </a:buClr>
+              <a:buSzPct val="80000"/>
+              <a:buFont typeface="Wingdings 3" charset="2"/>
+              <a:buChar char=""/>
+              <a:defRPr sz="1400" b="0" i="0" kern="1200">
+                <a:solidFill>
+                  <a:schemeClr val="tx1"/>
+                </a:solidFill>
+                <a:latin typeface="+mj-lt"/>
+                <a:ea typeface="+mj-ea"/>
+                <a:cs typeface="+mj-cs"/>
+              </a:defRPr>
+            </a:lvl9pPr>
+          </a:lstStyle>
+          <a:p>
+            <a:r>
+              <a:rPr lang="de-DE" dirty="0" err="1" smtClean="0"/>
+              <a:t>Adfadf</a:t>
+            </a:r>
+            <a:endParaRPr lang="de-DE" dirty="0" smtClean="0"/>
+          </a:p>
+          <a:p>
+            <a:r>
+              <a:rPr lang="de-DE" dirty="0" err="1" smtClean="0"/>
+              <a:t>adfadf</a:t>
+            </a:r>
+            <a:endParaRPr lang="de-DE" dirty="0"/>
+          </a:p>
+        </p:txBody>
+      </p:sp>
+    </p:spTree>
+    <p:extLst>
+      <p:ext uri="{BB962C8B-B14F-4D97-AF65-F5344CB8AC3E}">
+        <p14:creationId xmlns:p14="http://schemas.microsoft.com/office/powerpoint/2010/main" val="775034076"/>
+      </p:ext>
+    </p:extLst>
+  </p:cSld>
+  <p:clrMapOvr>
+    <a:masterClrMapping/>
+  </p:clrMapOvr>
+</p:sld>
+</file>
+
+<file path=ppt/slides/slide6.xml><?xml version="1.0" encoding="utf-8"?>
+<p:sld xmlns:a="http://schemas.openxmlformats.org/drawingml/2006/main" xmlns:r="http://schemas.openxmlformats.org/officeDocument/2006/relationships" xmlns:p="http://schemas.openxmlformats.org/presentationml/2006/main">
+  <p:cSld>
+    <p:spTree>
+      <p:nvGrpSpPr>
+        <p:cNvPr id="1" name=""/>
+        <p:cNvGrpSpPr/>
+        <p:nvPr/>
+      </p:nvGrpSpPr>
+      <p:grpSpPr>
+        <a:xfrm>
+          <a:off x="0" y="0"/>
+          <a:ext cx="0" cy="0"/>
+          <a:chOff x="0" y="0"/>
+          <a:chExt cx="0" cy="0"/>
+        </a:xfrm>
+      </p:grpSpPr>
+      <p:sp>
+        <p:nvSpPr>
+          <p:cNvPr id="2" name="Titel 1"/>
+          <p:cNvSpPr>
+            <a:spLocks noGrp="1"/>
+          </p:cNvSpPr>
+          <p:nvPr>
+            <p:ph type="title"/>
+          </p:nvPr>
+        </p:nvSpPr>
+        <p:spPr/>
+        <p:txBody>
+          <a:bodyPr/>
+          <a:lstStyle/>
+          <a:p>
+            <a:r>
+              <a:rPr lang="de-DE" dirty="0" smtClean="0"/>
+              <a:t>Suche</a:t>
+            </a:r>
+            <a:endParaRPr lang="de-DE" dirty="0"/>
+          </a:p>
+        </p:txBody>
+      </p:sp>
+      <p:pic>
+        <p:nvPicPr>
+          <p:cNvPr id="6" name="Inhaltsplatzhalter 5" descr="Bildschirmfoto 2015-06-23 um 22.12.00.png"/>
+          <p:cNvPicPr>
+            <a:picLocks noGrp="1" noChangeAspect="1"/>
+          </p:cNvPicPr>
+          <p:nvPr>
+            <p:ph idx="1"/>
+          </p:nvPr>
+        </p:nvPicPr>
+        <p:blipFill rotWithShape="1">
+          <a:blip r:embed="rId2">
+            <a:extLst>
+              <a:ext uri="{28A0092B-C50C-407E-A947-70E740481C1C}">
+                <a14:useLocalDpi xmlns:a14="http://schemas.microsoft.com/office/drawing/2010/main" val="0"/>
+              </a:ext>
+            </a:extLst>
+          </a:blip>
+          <a:srcRect l="57" t="-882" r="-282408" b="882"/>
+          <a:stretch/>
+        </p:blipFill>
+        <p:spPr>
+          <a:xfrm>
+            <a:off x="1103312" y="2052918"/>
+            <a:ext cx="8946541" cy="4195481"/>
+          </a:xfrm>
+        </p:spPr>
+      </p:pic>
+      <p:sp>
+        <p:nvSpPr>
+          <p:cNvPr id="7" name="Inhaltsplatzhalter 2"/>
+          <p:cNvSpPr txBox="1">
+            <a:spLocks/>
+          </p:cNvSpPr>
+          <p:nvPr/>
+        </p:nvSpPr>
+        <p:spPr>
+          <a:xfrm>
+            <a:off x="3773201" y="2095929"/>
+            <a:ext cx="6429052" cy="4117882"/>
+          </a:xfrm>
+          <a:prstGeom prst="rect">
+            <a:avLst/>
+          </a:prstGeom>
+        </p:spPr>
+        <p:txBody>
+          <a:bodyPr vert="horz" lIns="91440" tIns="45720" rIns="91440" bIns="45720" rtlCol="0">
+            <a:normAutofit/>
+          </a:bodyPr>
+          <a:lstStyle>
+            <a:lvl1pPr marL="342900" indent="-342900" algn="l" defTabSz="457200" rtl="0" eaLnBrk="1" latinLnBrk="0" hangingPunct="1">
+              <a:spcBef>
+                <a:spcPts val="1000"/>
+              </a:spcBef>
+              <a:spcAft>
+                <a:spcPts val="0"/>
+              </a:spcAft>
+              <a:buClr>
+                <a:schemeClr val="accent1"/>
+              </a:buClr>
+              <a:buSzPct val="80000"/>
+              <a:buFont typeface="Wingdings 3" charset="2"/>
+              <a:buChar char=""/>
+              <a:defRPr sz="2000" b="0" i="0" kern="1200">
+                <a:solidFill>
+                  <a:schemeClr val="tx1"/>
+                </a:solidFill>
+                <a:latin typeface="+mj-lt"/>
+                <a:ea typeface="+mj-ea"/>
+                <a:cs typeface="+mj-cs"/>
+              </a:defRPr>
+            </a:lvl1pPr>
+            <a:lvl2pPr marL="742950" indent="-285750" algn="l" defTabSz="457200" rtl="0" eaLnBrk="1" latinLnBrk="0" hangingPunct="1">
+              <a:spcBef>
+                <a:spcPts val="1000"/>
+              </a:spcBef>
+              <a:spcAft>
+                <a:spcPts val="0"/>
+              </a:spcAft>
+              <a:buClr>
+                <a:schemeClr val="accent1"/>
+              </a:buClr>
+              <a:buSzPct val="80000"/>
+              <a:buFont typeface="Wingdings 3" charset="2"/>
+              <a:buChar char=""/>
+              <a:defRPr sz="1800" b="0" i="0" kern="1200">
+                <a:solidFill>
+                  <a:schemeClr val="tx1"/>
+                </a:solidFill>
+                <a:latin typeface="+mj-lt"/>
+                <a:ea typeface="+mj-ea"/>
+                <a:cs typeface="+mj-cs"/>
+              </a:defRPr>
+            </a:lvl2pPr>
+            <a:lvl3pPr marL="1143000" indent="-228600" algn="l" defTabSz="457200" rtl="0" eaLnBrk="1" latinLnBrk="0" hangingPunct="1">
+              <a:spcBef>
+                <a:spcPts val="1000"/>
+              </a:spcBef>
+              <a:spcAft>
+                <a:spcPts val="0"/>
+              </a:spcAft>
+              <a:buClr>
+                <a:schemeClr val="accent1"/>
+              </a:buClr>
+              <a:buSzPct val="80000"/>
+              <a:buFont typeface="Wingdings 3" charset="2"/>
+              <a:buChar char=""/>
+              <a:defRPr sz="1600" b="0" i="0" kern="1200">
+                <a:solidFill>
+                  <a:schemeClr val="tx1"/>
+                </a:solidFill>
+                <a:latin typeface="+mj-lt"/>
+                <a:ea typeface="+mj-ea"/>
+                <a:cs typeface="+mj-cs"/>
+              </a:defRPr>
+            </a:lvl3pPr>
+            <a:lvl4pPr marL="1600200" indent="-228600" algn="l" defTabSz="457200" rtl="0" eaLnBrk="1" latinLnBrk="0" hangingPunct="1">
+              <a:spcBef>
+                <a:spcPts val="1000"/>
+              </a:spcBef>
+              <a:spcAft>
+                <a:spcPts val="0"/>
+              </a:spcAft>
+              <a:buClr>
+                <a:schemeClr val="accent1"/>
+              </a:buClr>
+              <a:buSzPct val="80000"/>
+              <a:buFont typeface="Wingdings 3" charset="2"/>
+              <a:buChar char=""/>
+              <a:defRPr sz="1400" b="0" i="0" kern="1200">
+                <a:solidFill>
+                  <a:schemeClr val="tx1"/>
+                </a:solidFill>
+                <a:latin typeface="+mj-lt"/>
+                <a:ea typeface="+mj-ea"/>
+                <a:cs typeface="+mj-cs"/>
+              </a:defRPr>
+            </a:lvl4pPr>
+            <a:lvl5pPr marL="2057400" indent="-228600" algn="l" defTabSz="457200" rtl="0" eaLnBrk="1" latinLnBrk="0" hangingPunct="1">
+              <a:spcBef>
+                <a:spcPts val="1000"/>
+              </a:spcBef>
+              <a:spcAft>
+                <a:spcPts val="0"/>
+              </a:spcAft>
+              <a:buClr>
+                <a:schemeClr val="accent1"/>
+              </a:buClr>
+              <a:buSzPct val="80000"/>
+              <a:buFont typeface="Wingdings 3" charset="2"/>
+              <a:buChar char=""/>
+              <a:defRPr sz="1400" b="0" i="0" kern="1200">
+                <a:solidFill>
+                  <a:schemeClr val="tx1"/>
+                </a:solidFill>
+                <a:latin typeface="+mj-lt"/>
+                <a:ea typeface="+mj-ea"/>
+                <a:cs typeface="+mj-cs"/>
+              </a:defRPr>
+            </a:lvl5pPr>
+            <a:lvl6pPr marL="2514600" indent="-228600" algn="l" defTabSz="457200" rtl="0" eaLnBrk="1" latinLnBrk="0" hangingPunct="1">
+              <a:spcBef>
+                <a:spcPts val="1000"/>
+              </a:spcBef>
+              <a:spcAft>
+                <a:spcPts val="0"/>
+              </a:spcAft>
+              <a:buClr>
+                <a:schemeClr val="accent1"/>
+              </a:buClr>
+              <a:buSzPct val="80000"/>
+              <a:buFont typeface="Wingdings 3" charset="2"/>
+              <a:buChar char=""/>
+              <a:defRPr sz="1400" b="0" i="0" kern="1200">
+                <a:solidFill>
+                  <a:schemeClr val="tx1"/>
+                </a:solidFill>
+                <a:latin typeface="+mj-lt"/>
+                <a:ea typeface="+mj-ea"/>
+                <a:cs typeface="+mj-cs"/>
+              </a:defRPr>
+            </a:lvl6pPr>
+            <a:lvl7pPr marL="2971800" indent="-228600" algn="l" defTabSz="457200" rtl="0" eaLnBrk="1" latinLnBrk="0" hangingPunct="1">
+              <a:spcBef>
+                <a:spcPts val="1000"/>
+              </a:spcBef>
+              <a:spcAft>
+                <a:spcPts val="0"/>
+              </a:spcAft>
+              <a:buClr>
+                <a:schemeClr val="accent1"/>
+              </a:buClr>
+              <a:buSzPct val="80000"/>
+              <a:buFont typeface="Wingdings 3" charset="2"/>
+              <a:buChar char=""/>
+              <a:defRPr sz="1400" b="0" i="0" kern="1200">
+                <a:solidFill>
+                  <a:schemeClr val="tx1"/>
+                </a:solidFill>
+                <a:latin typeface="+mj-lt"/>
+                <a:ea typeface="+mj-ea"/>
+                <a:cs typeface="+mj-cs"/>
+              </a:defRPr>
+            </a:lvl7pPr>
+            <a:lvl8pPr marL="3429000" indent="-228600" algn="l" defTabSz="457200" rtl="0" eaLnBrk="1" latinLnBrk="0" hangingPunct="1">
+              <a:spcBef>
+                <a:spcPts val="1000"/>
+              </a:spcBef>
+              <a:spcAft>
+                <a:spcPts val="0"/>
+              </a:spcAft>
+              <a:buClr>
+                <a:schemeClr val="accent1"/>
+              </a:buClr>
+              <a:buSzPct val="80000"/>
+              <a:buFont typeface="Wingdings 3" charset="2"/>
+              <a:buChar char=""/>
+              <a:defRPr sz="1400" b="0" i="0" kern="1200">
+                <a:solidFill>
+                  <a:schemeClr val="tx1"/>
+                </a:solidFill>
+                <a:latin typeface="+mj-lt"/>
+                <a:ea typeface="+mj-ea"/>
+                <a:cs typeface="+mj-cs"/>
+              </a:defRPr>
+            </a:lvl8pPr>
+            <a:lvl9pPr marL="3886200" indent="-228600" algn="l" defTabSz="457200" rtl="0" eaLnBrk="1" latinLnBrk="0" hangingPunct="1">
+              <a:spcBef>
+                <a:spcPts val="1000"/>
+              </a:spcBef>
+              <a:spcAft>
+                <a:spcPts val="0"/>
+              </a:spcAft>
+              <a:buClr>
+                <a:schemeClr val="accent1"/>
+              </a:buClr>
+              <a:buSzPct val="80000"/>
+              <a:buFont typeface="Wingdings 3" charset="2"/>
+              <a:buChar char=""/>
+              <a:defRPr sz="1400" b="0" i="0" kern="1200">
+                <a:solidFill>
+                  <a:schemeClr val="tx1"/>
+                </a:solidFill>
+                <a:latin typeface="+mj-lt"/>
+                <a:ea typeface="+mj-ea"/>
+                <a:cs typeface="+mj-cs"/>
+              </a:defRPr>
+            </a:lvl9pPr>
+          </a:lstStyle>
+          <a:p>
+            <a:r>
+              <a:rPr lang="de-DE" dirty="0" err="1" smtClean="0"/>
+              <a:t>Adfadf</a:t>
+            </a:r>
+            <a:endParaRPr lang="de-DE" dirty="0" smtClean="0"/>
+          </a:p>
+          <a:p>
+            <a:r>
+              <a:rPr lang="de-DE" dirty="0" err="1" smtClean="0"/>
+              <a:t>adfadf</a:t>
+            </a:r>
+            <a:endParaRPr lang="de-DE" dirty="0"/>
+          </a:p>
+        </p:txBody>
+      </p:sp>
+    </p:spTree>
+    <p:extLst>
+      <p:ext uri="{BB962C8B-B14F-4D97-AF65-F5344CB8AC3E}">
+        <p14:creationId xmlns:p14="http://schemas.microsoft.com/office/powerpoint/2010/main" val="3316431477"/>
+      </p:ext>
+    </p:extLst>
+  </p:cSld>
+  <p:clrMapOvr>
+    <a:masterClrMapping/>
+  </p:clrMapOvr>
+</p:sld>
+</file>
+
+<file path=ppt/slides/slide7.xml><?xml version="1.0" encoding="utf-8"?>
+<p:sld xmlns:a="http://schemas.openxmlformats.org/drawingml/2006/main" xmlns:r="http://schemas.openxmlformats.org/officeDocument/2006/relationships" xmlns:p="http://schemas.openxmlformats.org/presentationml/2006/main">
+  <p:cSld>
+    <p:spTree>
+      <p:nvGrpSpPr>
+        <p:cNvPr id="1" name=""/>
+        <p:cNvGrpSpPr/>
+        <p:nvPr/>
+      </p:nvGrpSpPr>
+      <p:grpSpPr>
+        <a:xfrm>
+          <a:off x="0" y="0"/>
+          <a:ext cx="0" cy="0"/>
+          <a:chOff x="0" y="0"/>
+          <a:chExt cx="0" cy="0"/>
+        </a:xfrm>
+      </p:grpSpPr>
+      <p:sp>
+        <p:nvSpPr>
+          <p:cNvPr id="2" name="Titel 1"/>
+          <p:cNvSpPr>
+            <a:spLocks noGrp="1"/>
+          </p:cNvSpPr>
+          <p:nvPr>
+            <p:ph type="title"/>
+          </p:nvPr>
+        </p:nvSpPr>
+        <p:spPr/>
+        <p:txBody>
+          <a:bodyPr/>
+          <a:lstStyle/>
+          <a:p>
+            <a:r>
+              <a:rPr lang="de-DE" dirty="0" smtClean="0"/>
+              <a:t>Detail-Seite</a:t>
+            </a:r>
+            <a:endParaRPr lang="de-DE" dirty="0"/>
+          </a:p>
+        </p:txBody>
+      </p:sp>
+      <p:pic>
+        <p:nvPicPr>
+          <p:cNvPr id="4" name="Inhaltsplatzhalter 5" descr="Bildschirmfoto 2015-06-23 um 22.12.00.png"/>
+          <p:cNvPicPr>
+            <a:picLocks noGrp="1" noChangeAspect="1"/>
+          </p:cNvPicPr>
+          <p:nvPr>
+            <p:ph idx="1"/>
+          </p:nvPr>
+        </p:nvPicPr>
+        <p:blipFill rotWithShape="1">
+          <a:blip r:embed="rId2">
+            <a:extLst>
+              <a:ext uri="{28A0092B-C50C-407E-A947-70E740481C1C}">
+                <a14:useLocalDpi xmlns:a14="http://schemas.microsoft.com/office/drawing/2010/main" val="0"/>
+              </a:ext>
+            </a:extLst>
+          </a:blip>
+          <a:srcRect l="57" t="-882" r="-282408" b="882"/>
+          <a:stretch/>
+        </p:blipFill>
+        <p:spPr>
+          <a:xfrm>
+            <a:off x="1103312" y="2052918"/>
+            <a:ext cx="8946541" cy="4195481"/>
+          </a:xfrm>
+        </p:spPr>
+      </p:pic>
+      <p:sp>
+        <p:nvSpPr>
+          <p:cNvPr id="5" name="Inhaltsplatzhalter 2"/>
+          <p:cNvSpPr txBox="1">
+            <a:spLocks/>
+          </p:cNvSpPr>
+          <p:nvPr/>
+        </p:nvSpPr>
+        <p:spPr>
+          <a:xfrm>
+            <a:off x="3773201" y="2095929"/>
+            <a:ext cx="6429052" cy="4117882"/>
+          </a:xfrm>
+          <a:prstGeom prst="rect">
+            <a:avLst/>
+          </a:prstGeom>
+        </p:spPr>
+        <p:txBody>
+          <a:bodyPr vert="horz" lIns="91440" tIns="45720" rIns="91440" bIns="45720" rtlCol="0">
+            <a:normAutofit/>
+          </a:bodyPr>
+          <a:lstStyle>
+            <a:lvl1pPr marL="342900" indent="-342900" algn="l" defTabSz="457200" rtl="0" eaLnBrk="1" latinLnBrk="0" hangingPunct="1">
+              <a:spcBef>
+                <a:spcPts val="1000"/>
+              </a:spcBef>
+              <a:spcAft>
+                <a:spcPts val="0"/>
+              </a:spcAft>
+              <a:buClr>
+                <a:schemeClr val="accent1"/>
+              </a:buClr>
+              <a:buSzPct val="80000"/>
+              <a:buFont typeface="Wingdings 3" charset="2"/>
+              <a:buChar char=""/>
+              <a:defRPr sz="2000" b="0" i="0" kern="1200">
+                <a:solidFill>
+                  <a:schemeClr val="tx1"/>
+                </a:solidFill>
+                <a:latin typeface="+mj-lt"/>
+                <a:ea typeface="+mj-ea"/>
+                <a:cs typeface="+mj-cs"/>
+              </a:defRPr>
+            </a:lvl1pPr>
+            <a:lvl2pPr marL="742950" indent="-285750" algn="l" defTabSz="457200" rtl="0" eaLnBrk="1" latinLnBrk="0" hangingPunct="1">
+              <a:spcBef>
+                <a:spcPts val="1000"/>
+              </a:spcBef>
+              <a:spcAft>
+                <a:spcPts val="0"/>
+              </a:spcAft>
+              <a:buClr>
+                <a:schemeClr val="accent1"/>
+              </a:buClr>
+              <a:buSzPct val="80000"/>
+              <a:buFont typeface="Wingdings 3" charset="2"/>
+              <a:buChar char=""/>
+              <a:defRPr sz="1800" b="0" i="0" kern="1200">
+                <a:solidFill>
+                  <a:schemeClr val="tx1"/>
+                </a:solidFill>
+                <a:latin typeface="+mj-lt"/>
+                <a:ea typeface="+mj-ea"/>
+                <a:cs typeface="+mj-cs"/>
+              </a:defRPr>
+            </a:lvl2pPr>
+            <a:lvl3pPr marL="1143000" indent="-228600" algn="l" defTabSz="457200" rtl="0" eaLnBrk="1" latinLnBrk="0" hangingPunct="1">
+              <a:spcBef>
+                <a:spcPts val="1000"/>
+              </a:spcBef>
+              <a:spcAft>
+                <a:spcPts val="0"/>
+              </a:spcAft>
+              <a:buClr>
+                <a:schemeClr val="accent1"/>
+              </a:buClr>
+              <a:buSzPct val="80000"/>
+              <a:buFont typeface="Wingdings 3" charset="2"/>
+              <a:buChar char=""/>
+              <a:defRPr sz="1600" b="0" i="0" kern="1200">
+                <a:solidFill>
+                  <a:schemeClr val="tx1"/>
+                </a:solidFill>
+                <a:latin typeface="+mj-lt"/>
+                <a:ea typeface="+mj-ea"/>
+                <a:cs typeface="+mj-cs"/>
+              </a:defRPr>
+            </a:lvl3pPr>
+            <a:lvl4pPr marL="1600200" indent="-228600" algn="l" defTabSz="457200" rtl="0" eaLnBrk="1" latinLnBrk="0" hangingPunct="1">
+              <a:spcBef>
+                <a:spcPts val="1000"/>
+              </a:spcBef>
+              <a:spcAft>
+                <a:spcPts val="0"/>
+              </a:spcAft>
+              <a:buClr>
+                <a:schemeClr val="accent1"/>
+              </a:buClr>
+              <a:buSzPct val="80000"/>
+              <a:buFont typeface="Wingdings 3" charset="2"/>
+              <a:buChar char=""/>
+              <a:defRPr sz="1400" b="0" i="0" kern="1200">
+                <a:solidFill>
+                  <a:schemeClr val="tx1"/>
+                </a:solidFill>
+                <a:latin typeface="+mj-lt"/>
+                <a:ea typeface="+mj-ea"/>
+                <a:cs typeface="+mj-cs"/>
+              </a:defRPr>
+            </a:lvl4pPr>
+            <a:lvl5pPr marL="2057400" indent="-228600" algn="l" defTabSz="457200" rtl="0" eaLnBrk="1" latinLnBrk="0" hangingPunct="1">
+              <a:spcBef>
+                <a:spcPts val="1000"/>
+              </a:spcBef>
+              <a:spcAft>
+                <a:spcPts val="0"/>
+              </a:spcAft>
+              <a:buClr>
+                <a:schemeClr val="accent1"/>
+              </a:buClr>
+              <a:buSzPct val="80000"/>
+              <a:buFont typeface="Wingdings 3" charset="2"/>
+              <a:buChar char=""/>
+              <a:defRPr sz="1400" b="0" i="0" kern="1200">
+                <a:solidFill>
+                  <a:schemeClr val="tx1"/>
+                </a:solidFill>
+                <a:latin typeface="+mj-lt"/>
+                <a:ea typeface="+mj-ea"/>
+                <a:cs typeface="+mj-cs"/>
+              </a:defRPr>
+            </a:lvl5pPr>
+            <a:lvl6pPr marL="2514600" indent="-228600" algn="l" defTabSz="457200" rtl="0" eaLnBrk="1" latinLnBrk="0" hangingPunct="1">
+              <a:spcBef>
+                <a:spcPts val="1000"/>
+              </a:spcBef>
+              <a:spcAft>
+                <a:spcPts val="0"/>
+              </a:spcAft>
+              <a:buClr>
+                <a:schemeClr val="accent1"/>
+              </a:buClr>
+              <a:buSzPct val="80000"/>
+              <a:buFont typeface="Wingdings 3" charset="2"/>
+              <a:buChar char=""/>
+              <a:defRPr sz="1400" b="0" i="0" kern="1200">
+                <a:solidFill>
+                  <a:schemeClr val="tx1"/>
+                </a:solidFill>
+                <a:latin typeface="+mj-lt"/>
+                <a:ea typeface="+mj-ea"/>
+                <a:cs typeface="+mj-cs"/>
+              </a:defRPr>
+            </a:lvl6pPr>
+            <a:lvl7pPr marL="2971800" indent="-228600" algn="l" defTabSz="457200" rtl="0" eaLnBrk="1" latinLnBrk="0" hangingPunct="1">
+              <a:spcBef>
+                <a:spcPts val="1000"/>
+              </a:spcBef>
+              <a:spcAft>
+                <a:spcPts val="0"/>
+              </a:spcAft>
+              <a:buClr>
+                <a:schemeClr val="accent1"/>
+              </a:buClr>
+              <a:buSzPct val="80000"/>
+              <a:buFont typeface="Wingdings 3" charset="2"/>
+              <a:buChar char=""/>
+              <a:defRPr sz="1400" b="0" i="0" kern="1200">
+                <a:solidFill>
+                  <a:schemeClr val="tx1"/>
+                </a:solidFill>
+                <a:latin typeface="+mj-lt"/>
+                <a:ea typeface="+mj-ea"/>
+                <a:cs typeface="+mj-cs"/>
+              </a:defRPr>
+            </a:lvl7pPr>
+            <a:lvl8pPr marL="3429000" indent="-228600" algn="l" defTabSz="457200" rtl="0" eaLnBrk="1" latinLnBrk="0" hangingPunct="1">
+              <a:spcBef>
+                <a:spcPts val="1000"/>
+              </a:spcBef>
+              <a:spcAft>
+                <a:spcPts val="0"/>
+              </a:spcAft>
+              <a:buClr>
+                <a:schemeClr val="accent1"/>
+              </a:buClr>
+              <a:buSzPct val="80000"/>
+              <a:buFont typeface="Wingdings 3" charset="2"/>
+              <a:buChar char=""/>
+              <a:defRPr sz="1400" b="0" i="0" kern="1200">
+                <a:solidFill>
+                  <a:schemeClr val="tx1"/>
+                </a:solidFill>
+                <a:latin typeface="+mj-lt"/>
+                <a:ea typeface="+mj-ea"/>
+                <a:cs typeface="+mj-cs"/>
+              </a:defRPr>
+            </a:lvl8pPr>
+            <a:lvl9pPr marL="3886200" indent="-228600" algn="l" defTabSz="457200" rtl="0" eaLnBrk="1" latinLnBrk="0" hangingPunct="1">
+              <a:spcBef>
+                <a:spcPts val="1000"/>
+              </a:spcBef>
+              <a:spcAft>
+                <a:spcPts val="0"/>
+              </a:spcAft>
+              <a:buClr>
+                <a:schemeClr val="accent1"/>
+              </a:buClr>
+              <a:buSzPct val="80000"/>
+              <a:buFont typeface="Wingdings 3" charset="2"/>
+              <a:buChar char=""/>
+              <a:defRPr sz="1400" b="0" i="0" kern="1200">
+                <a:solidFill>
+                  <a:schemeClr val="tx1"/>
+                </a:solidFill>
+                <a:latin typeface="+mj-lt"/>
+                <a:ea typeface="+mj-ea"/>
+                <a:cs typeface="+mj-cs"/>
+              </a:defRPr>
+            </a:lvl9pPr>
+          </a:lstStyle>
+          <a:p>
+            <a:r>
+              <a:rPr lang="de-DE" dirty="0" err="1" smtClean="0"/>
+              <a:t>Adfadf</a:t>
+            </a:r>
+            <a:endParaRPr lang="de-DE" dirty="0" smtClean="0"/>
+          </a:p>
+          <a:p>
+            <a:r>
+              <a:rPr lang="de-DE" dirty="0" err="1" smtClean="0"/>
+              <a:t>adfadf</a:t>
+            </a:r>
+            <a:endParaRPr lang="de-DE" dirty="0"/>
+          </a:p>
+        </p:txBody>
+      </p:sp>
+    </p:spTree>
+    <p:extLst>
+      <p:ext uri="{BB962C8B-B14F-4D97-AF65-F5344CB8AC3E}">
+        <p14:creationId xmlns:p14="http://schemas.microsoft.com/office/powerpoint/2010/main" val="1109848632"/>
+      </p:ext>
+    </p:extLst>
+  </p:cSld>
+  <p:clrMapOvr>
+    <a:masterClrMapping/>
+  </p:clrMapOvr>
+</p:sld>
+</file>
+
+<file path=ppt/slides/slide8.xml><?xml version="1.0" encoding="utf-8"?>
+<p:sld xmlns:a="http://schemas.openxmlformats.org/drawingml/2006/main" xmlns:r="http://schemas.openxmlformats.org/officeDocument/2006/relationships" xmlns:p="http://schemas.openxmlformats.org/presentationml/2006/main">
+  <p:cSld>
+    <p:spTree>
+      <p:nvGrpSpPr>
+        <p:cNvPr id="1" name=""/>
+        <p:cNvGrpSpPr/>
+        <p:nvPr/>
+      </p:nvGrpSpPr>
+      <p:grpSpPr>
+        <a:xfrm>
+          <a:off x="0" y="0"/>
+          <a:ext cx="0" cy="0"/>
+          <a:chOff x="0" y="0"/>
+          <a:chExt cx="0" cy="0"/>
+        </a:xfrm>
+      </p:grpSpPr>
+      <p:sp>
+        <p:nvSpPr>
+          <p:cNvPr id="2" name="Titel 1"/>
+          <p:cNvSpPr>
+            <a:spLocks noGrp="1"/>
+          </p:cNvSpPr>
+          <p:nvPr>
+            <p:ph type="ctrTitle"/>
+          </p:nvPr>
+        </p:nvSpPr>
+        <p:spPr/>
+        <p:txBody>
+          <a:bodyPr/>
+          <a:lstStyle/>
+          <a:p>
+            <a:r>
+              <a:rPr lang="de-DE" dirty="0" err="1" smtClean="0"/>
+              <a:t>Rezeptapp</a:t>
+            </a:r>
+            <a:endParaRPr lang="de-DE" dirty="0"/>
+          </a:p>
+        </p:txBody>
+      </p:sp>
+      <p:sp>
+        <p:nvSpPr>
+          <p:cNvPr id="3" name="Untertitel 2"/>
+          <p:cNvSpPr>
+            <a:spLocks noGrp="1"/>
+          </p:cNvSpPr>
+          <p:nvPr>
+            <p:ph type="subTitle" idx="1"/>
+          </p:nvPr>
+        </p:nvSpPr>
+        <p:spPr/>
+        <p:txBody>
+          <a:bodyPr/>
+          <a:lstStyle/>
+          <a:p>
+            <a:r>
+              <a:rPr lang="de-DE" dirty="0" smtClean="0"/>
+              <a:t>App-programmierung von Anna S. Rodewald und </a:t>
+            </a:r>
+            <a:r>
+              <a:rPr lang="de-DE" dirty="0" err="1" smtClean="0"/>
+              <a:t>wenja</a:t>
+            </a:r>
+            <a:r>
+              <a:rPr lang="de-DE" dirty="0" smtClean="0"/>
+              <a:t> </a:t>
+            </a:r>
+            <a:r>
+              <a:rPr lang="de-DE" dirty="0" err="1" smtClean="0"/>
+              <a:t>shan</a:t>
+            </a:r>
+            <a:endParaRPr lang="de-DE" dirty="0"/>
+          </a:p>
+        </p:txBody>
+      </p:sp>
+    </p:spTree>
+    <p:extLst>
+      <p:ext uri="{BB962C8B-B14F-4D97-AF65-F5344CB8AC3E}">
+        <p14:creationId xmlns:p14="http://schemas.microsoft.com/office/powerpoint/2010/main" val="876706863"/>
+      </p:ext>
+    </p:extLst>
+  </p:cSld>
+  <p:clrMapOvr>
+    <a:masterClrMapping/>
+  </p:clrMapOvr>
+  <p:timing>
+    <p:tnLst>
+      <p:par>
+        <p:cTn xmlns:p14="http://schemas.microsoft.com/office/powerpoint/2010/main" id="1" dur="indefinite" restart="never" nodeType="tmRoot"/>
+      </p:par>
+    </p:tnLst>
+  </p:timing>
 </p:sld>
 </file>
 

</xml_diff>